<commit_message>
added code screenshots for game demo
</commit_message>
<xml_diff>
--- a/Docs/presentations/PPT UMCG Feniks 2005.pptx
+++ b/Docs/presentations/PPT UMCG Feniks 2005.pptx
@@ -13,6 +13,9 @@
     <p:sldId id="258" r:id="rId10"/>
     <p:sldId id="259" r:id="rId11"/>
     <p:sldId id="260" r:id="rId12"/>
+    <p:sldId id="261" r:id="rId13"/>
+    <p:sldId id="262" r:id="rId14"/>
+    <p:sldId id="263" r:id="rId15"/>
   </p:sldIdLst>
   <p:sldSz cx="24384000" cy="13716000"/>
   <p:notesSz cx="6858000" cy="9144000"/>
@@ -4229,58 +4232,6 @@
           </a:p>
         </p:txBody>
       </p:sp>
-      <p:sp>
-        <p:nvSpPr>
-          <p:cNvPr id="155" name="Double-click to edit"/>
-          <p:cNvSpPr txBox="1"/>
-          <p:nvPr>
-            <p:ph type="body" sz="half" idx="1"/>
-          </p:nvPr>
-        </p:nvSpPr>
-        <p:spPr>
-          <a:prstGeom prst="rect">
-            <a:avLst/>
-          </a:prstGeom>
-        </p:spPr>
-        <p:txBody>
-          <a:bodyPr/>
-          <a:lstStyle/>
-          <a:p>
-            <a:pPr/>
-          </a:p>
-        </p:txBody>
-      </p:sp>
-      <p:sp>
-        <p:nvSpPr>
-          <p:cNvPr id="156" name="Slide Number"/>
-          <p:cNvSpPr txBox="1"/>
-          <p:nvPr>
-            <p:ph type="sldNum" sz="quarter" idx="4294967295"/>
-          </p:nvPr>
-        </p:nvSpPr>
-        <p:spPr>
-          <a:xfrm>
-            <a:off x="12052300" y="13017500"/>
-            <a:ext cx="266701" cy="508000"/>
-          </a:xfrm>
-          <a:prstGeom prst="rect">
-            <a:avLst/>
-          </a:prstGeom>
-          <a:extLst>
-            <a:ext uri="{C572A759-6A51-4108-AA02-DFA0A04FC94B}">
-              <ma14:wrappingTextBoxFlag xmlns:ma14="http://schemas.microsoft.com/office/mac/drawingml/2011/main" val="1"/>
-            </a:ext>
-          </a:extLst>
-        </p:spPr>
-        <p:txBody>
-          <a:bodyPr/>
-          <a:lstStyle/>
-          <a:p>
-            <a:pPr/>
-            <a:fld id="{86CB4B4D-7CA3-9044-876B-883B54F8677D}" type="slidenum"/>
-          </a:p>
-        </p:txBody>
-      </p:sp>
     </p:spTree>
   </p:cSld>
   <p:clrMapOvr>
@@ -4307,9 +4258,447 @@
           <a:chExt cx="0" cy="0"/>
         </a:xfrm>
       </p:grpSpPr>
+      <p:grpSp>
+        <p:nvGrpSpPr>
+          <p:cNvPr id="158" name="Image"/>
+          <p:cNvGrpSpPr/>
+          <p:nvPr/>
+        </p:nvGrpSpPr>
+        <p:grpSpPr>
+          <a:xfrm>
+            <a:off x="79038" y="653428"/>
+            <a:ext cx="12048511" cy="12409144"/>
+            <a:chOff x="0" y="0"/>
+            <a:chExt cx="12048510" cy="12409142"/>
+          </a:xfrm>
+        </p:grpSpPr>
+        <p:pic>
+          <p:nvPicPr>
+            <p:cNvPr id="157" name="Image" descr="Image"/>
+            <p:cNvPicPr>
+              <a:picLocks noChangeAspect="1"/>
+            </p:cNvPicPr>
+            <p:nvPr/>
+          </p:nvPicPr>
+          <p:blipFill>
+            <a:blip r:embed="rId2">
+              <a:extLst/>
+            </a:blip>
+            <a:stretch>
+              <a:fillRect/>
+            </a:stretch>
+          </p:blipFill>
+          <p:spPr>
+            <a:xfrm>
+              <a:off x="127000" y="88900"/>
+              <a:ext cx="11794511" cy="12078943"/>
+            </a:xfrm>
+            <a:prstGeom prst="rect">
+              <a:avLst/>
+            </a:prstGeom>
+            <a:ln>
+              <a:noFill/>
+            </a:ln>
+            <a:effectLst/>
+          </p:spPr>
+        </p:pic>
+        <p:pic>
+          <p:nvPicPr>
+            <p:cNvPr id="156" name="Image" descr="Image"/>
+            <p:cNvPicPr>
+              <a:picLocks noChangeAspect="0"/>
+            </p:cNvPicPr>
+            <p:nvPr/>
+          </p:nvPicPr>
+          <p:blipFill>
+            <a:blip r:embed="rId3">
+              <a:extLst/>
+            </a:blip>
+            <a:stretch>
+              <a:fillRect/>
+            </a:stretch>
+          </p:blipFill>
+          <p:spPr>
+            <a:xfrm>
+              <a:off x="0" y="0"/>
+              <a:ext cx="12048511" cy="12409143"/>
+            </a:xfrm>
+            <a:prstGeom prst="rect">
+              <a:avLst/>
+            </a:prstGeom>
+            <a:effectLst/>
+          </p:spPr>
+        </p:pic>
+      </p:grpSp>
+      <p:grpSp>
+        <p:nvGrpSpPr>
+          <p:cNvPr id="161" name="Image"/>
+          <p:cNvGrpSpPr/>
+          <p:nvPr/>
+        </p:nvGrpSpPr>
+        <p:grpSpPr>
+          <a:xfrm>
+            <a:off x="12331479" y="2119882"/>
+            <a:ext cx="12048511" cy="9080405"/>
+            <a:chOff x="0" y="0"/>
+            <a:chExt cx="12048510" cy="9080404"/>
+          </a:xfrm>
+        </p:grpSpPr>
+        <p:pic>
+          <p:nvPicPr>
+            <p:cNvPr id="160" name="Image" descr="Image"/>
+            <p:cNvPicPr>
+              <a:picLocks noChangeAspect="1"/>
+            </p:cNvPicPr>
+            <p:nvPr/>
+          </p:nvPicPr>
+          <p:blipFill>
+            <a:blip r:embed="rId4">
+              <a:extLst/>
+            </a:blip>
+            <a:stretch>
+              <a:fillRect/>
+            </a:stretch>
+          </p:blipFill>
+          <p:spPr>
+            <a:xfrm>
+              <a:off x="127000" y="88900"/>
+              <a:ext cx="11794511" cy="8750205"/>
+            </a:xfrm>
+            <a:prstGeom prst="rect">
+              <a:avLst/>
+            </a:prstGeom>
+            <a:ln>
+              <a:noFill/>
+            </a:ln>
+            <a:effectLst/>
+          </p:spPr>
+        </p:pic>
+        <p:pic>
+          <p:nvPicPr>
+            <p:cNvPr id="159" name="Image" descr="Image"/>
+            <p:cNvPicPr>
+              <a:picLocks noChangeAspect="0"/>
+            </p:cNvPicPr>
+            <p:nvPr/>
+          </p:nvPicPr>
+          <p:blipFill>
+            <a:blip r:embed="rId5">
+              <a:extLst/>
+            </a:blip>
+            <a:stretch>
+              <a:fillRect/>
+            </a:stretch>
+          </p:blipFill>
+          <p:spPr>
+            <a:xfrm>
+              <a:off x="0" y="0"/>
+              <a:ext cx="12048511" cy="9080405"/>
+            </a:xfrm>
+            <a:prstGeom prst="rect">
+              <a:avLst/>
+            </a:prstGeom>
+            <a:effectLst/>
+          </p:spPr>
+        </p:pic>
+      </p:grpSp>
+    </p:spTree>
+  </p:cSld>
+  <p:clrMapOvr>
+    <a:masterClrMapping/>
+  </p:clrMapOvr>
+  <p:transition xmlns:p14="http://schemas.microsoft.com/office/powerpoint/2010/main" spd="med" advClick="1"/>
+</p:sld>
+</file>
+
+<file path=ppt/slides/slide6.xml><?xml version="1.0" encoding="utf-8"?>
+<p:sld xmlns:a="http://schemas.openxmlformats.org/drawingml/2006/main" xmlns:r="http://schemas.openxmlformats.org/officeDocument/2006/relationships" xmlns:p="http://schemas.openxmlformats.org/presentationml/2006/main" xmlns:m="http://schemas.openxmlformats.org/officeDocument/2006/math" xmlns:a14="http://schemas.microsoft.com/office/drawing/2010/main" showMasterSp="1" showMasterPhAnim="1">
+  <p:cSld>
+    <p:spTree>
+      <p:nvGrpSpPr>
+        <p:cNvPr id="1" name=""/>
+        <p:cNvGrpSpPr/>
+        <p:nvPr/>
+      </p:nvGrpSpPr>
+      <p:grpSpPr>
+        <a:xfrm>
+          <a:off x="0" y="0"/>
+          <a:ext cx="0" cy="0"/>
+          <a:chOff x="0" y="0"/>
+          <a:chExt cx="0" cy="0"/>
+        </a:xfrm>
+      </p:grpSpPr>
+      <p:grpSp>
+        <p:nvGrpSpPr>
+          <p:cNvPr id="165" name="Image"/>
+          <p:cNvGrpSpPr/>
+          <p:nvPr/>
+        </p:nvGrpSpPr>
+        <p:grpSpPr>
+          <a:xfrm>
+            <a:off x="77217" y="2244292"/>
+            <a:ext cx="11848821" cy="9379816"/>
+            <a:chOff x="0" y="0"/>
+            <a:chExt cx="11848819" cy="9379815"/>
+          </a:xfrm>
+        </p:grpSpPr>
+        <p:pic>
+          <p:nvPicPr>
+            <p:cNvPr id="164" name="Image" descr="Image"/>
+            <p:cNvPicPr>
+              <a:picLocks noChangeAspect="1"/>
+            </p:cNvPicPr>
+            <p:nvPr/>
+          </p:nvPicPr>
+          <p:blipFill>
+            <a:blip r:embed="rId2">
+              <a:extLst/>
+            </a:blip>
+            <a:stretch>
+              <a:fillRect/>
+            </a:stretch>
+          </p:blipFill>
+          <p:spPr>
+            <a:xfrm>
+              <a:off x="127000" y="88900"/>
+              <a:ext cx="11594820" cy="9049616"/>
+            </a:xfrm>
+            <a:prstGeom prst="rect">
+              <a:avLst/>
+            </a:prstGeom>
+            <a:ln>
+              <a:noFill/>
+            </a:ln>
+            <a:effectLst/>
+          </p:spPr>
+        </p:pic>
+        <p:pic>
+          <p:nvPicPr>
+            <p:cNvPr id="163" name="Image" descr="Image"/>
+            <p:cNvPicPr>
+              <a:picLocks noChangeAspect="0"/>
+            </p:cNvPicPr>
+            <p:nvPr/>
+          </p:nvPicPr>
+          <p:blipFill>
+            <a:blip r:embed="rId3">
+              <a:extLst/>
+            </a:blip>
+            <a:stretch>
+              <a:fillRect/>
+            </a:stretch>
+          </p:blipFill>
+          <p:spPr>
+            <a:xfrm>
+              <a:off x="0" y="0"/>
+              <a:ext cx="11848820" cy="9379816"/>
+            </a:xfrm>
+            <a:prstGeom prst="rect">
+              <a:avLst/>
+            </a:prstGeom>
+            <a:effectLst/>
+          </p:spPr>
+        </p:pic>
+      </p:grpSp>
+      <p:grpSp>
+        <p:nvGrpSpPr>
+          <p:cNvPr id="168" name="Image"/>
+          <p:cNvGrpSpPr/>
+          <p:nvPr/>
+        </p:nvGrpSpPr>
+        <p:grpSpPr>
+          <a:xfrm>
+            <a:off x="12325500" y="1089384"/>
+            <a:ext cx="11498884" cy="11689632"/>
+            <a:chOff x="0" y="0"/>
+            <a:chExt cx="11498882" cy="11689631"/>
+          </a:xfrm>
+        </p:grpSpPr>
+        <p:pic>
+          <p:nvPicPr>
+            <p:cNvPr id="167" name="Image" descr="Image"/>
+            <p:cNvPicPr>
+              <a:picLocks noChangeAspect="1"/>
+            </p:cNvPicPr>
+            <p:nvPr/>
+          </p:nvPicPr>
+          <p:blipFill>
+            <a:blip r:embed="rId4">
+              <a:extLst/>
+            </a:blip>
+            <a:stretch>
+              <a:fillRect/>
+            </a:stretch>
+          </p:blipFill>
+          <p:spPr>
+            <a:xfrm>
+              <a:off x="127000" y="88900"/>
+              <a:ext cx="11244883" cy="11359432"/>
+            </a:xfrm>
+            <a:prstGeom prst="rect">
+              <a:avLst/>
+            </a:prstGeom>
+            <a:ln>
+              <a:noFill/>
+            </a:ln>
+            <a:effectLst/>
+          </p:spPr>
+        </p:pic>
+        <p:pic>
+          <p:nvPicPr>
+            <p:cNvPr id="166" name="Image" descr="Image"/>
+            <p:cNvPicPr>
+              <a:picLocks noChangeAspect="0"/>
+            </p:cNvPicPr>
+            <p:nvPr/>
+          </p:nvPicPr>
+          <p:blipFill>
+            <a:blip r:embed="rId5">
+              <a:extLst/>
+            </a:blip>
+            <a:stretch>
+              <a:fillRect/>
+            </a:stretch>
+          </p:blipFill>
+          <p:spPr>
+            <a:xfrm>
+              <a:off x="0" y="0"/>
+              <a:ext cx="11498883" cy="11689632"/>
+            </a:xfrm>
+            <a:prstGeom prst="rect">
+              <a:avLst/>
+            </a:prstGeom>
+            <a:effectLst/>
+          </p:spPr>
+        </p:pic>
+      </p:grpSp>
+    </p:spTree>
+  </p:cSld>
+  <p:clrMapOvr>
+    <a:masterClrMapping/>
+  </p:clrMapOvr>
+  <p:transition xmlns:p14="http://schemas.microsoft.com/office/powerpoint/2010/main" spd="med" advClick="1"/>
+</p:sld>
+</file>
+
+<file path=ppt/slides/slide7.xml><?xml version="1.0" encoding="utf-8"?>
+<p:sld xmlns:a="http://schemas.openxmlformats.org/drawingml/2006/main" xmlns:r="http://schemas.openxmlformats.org/officeDocument/2006/relationships" xmlns:p="http://schemas.openxmlformats.org/presentationml/2006/main" xmlns:m="http://schemas.openxmlformats.org/officeDocument/2006/math" xmlns:a14="http://schemas.microsoft.com/office/drawing/2010/main" showMasterSp="1" showMasterPhAnim="1">
+  <p:cSld>
+    <p:spTree>
+      <p:nvGrpSpPr>
+        <p:cNvPr id="1" name=""/>
+        <p:cNvGrpSpPr/>
+        <p:nvPr/>
+      </p:nvGrpSpPr>
+      <p:grpSpPr>
+        <a:xfrm>
+          <a:off x="0" y="0"/>
+          <a:ext cx="0" cy="0"/>
+          <a:chOff x="0" y="0"/>
+          <a:chExt cx="0" cy="0"/>
+        </a:xfrm>
+      </p:grpSpPr>
+      <p:grpSp>
+        <p:nvGrpSpPr>
+          <p:cNvPr id="172" name="Image"/>
+          <p:cNvGrpSpPr/>
+          <p:nvPr/>
+        </p:nvGrpSpPr>
+        <p:grpSpPr>
+          <a:xfrm>
+            <a:off x="5408018" y="209064"/>
+            <a:ext cx="13567964" cy="13450272"/>
+            <a:chOff x="0" y="0"/>
+            <a:chExt cx="13567962" cy="13450270"/>
+          </a:xfrm>
+        </p:grpSpPr>
+        <p:pic>
+          <p:nvPicPr>
+            <p:cNvPr id="171" name="Image" descr="Image"/>
+            <p:cNvPicPr>
+              <a:picLocks noChangeAspect="1"/>
+            </p:cNvPicPr>
+            <p:nvPr/>
+          </p:nvPicPr>
+          <p:blipFill>
+            <a:blip r:embed="rId2">
+              <a:extLst/>
+            </a:blip>
+            <a:stretch>
+              <a:fillRect/>
+            </a:stretch>
+          </p:blipFill>
+          <p:spPr>
+            <a:xfrm>
+              <a:off x="127000" y="88900"/>
+              <a:ext cx="13313963" cy="13120071"/>
+            </a:xfrm>
+            <a:prstGeom prst="rect">
+              <a:avLst/>
+            </a:prstGeom>
+            <a:ln>
+              <a:noFill/>
+            </a:ln>
+            <a:effectLst/>
+          </p:spPr>
+        </p:pic>
+        <p:pic>
+          <p:nvPicPr>
+            <p:cNvPr id="170" name="Image" descr="Image"/>
+            <p:cNvPicPr>
+              <a:picLocks noChangeAspect="0"/>
+            </p:cNvPicPr>
+            <p:nvPr/>
+          </p:nvPicPr>
+          <p:blipFill>
+            <a:blip r:embed="rId3">
+              <a:extLst/>
+            </a:blip>
+            <a:stretch>
+              <a:fillRect/>
+            </a:stretch>
+          </p:blipFill>
+          <p:spPr>
+            <a:xfrm>
+              <a:off x="0" y="0"/>
+              <a:ext cx="13567963" cy="13450271"/>
+            </a:xfrm>
+            <a:prstGeom prst="rect">
+              <a:avLst/>
+            </a:prstGeom>
+            <a:effectLst/>
+          </p:spPr>
+        </p:pic>
+      </p:grpSp>
+    </p:spTree>
+  </p:cSld>
+  <p:clrMapOvr>
+    <a:masterClrMapping/>
+  </p:clrMapOvr>
+  <p:transition xmlns:p14="http://schemas.microsoft.com/office/powerpoint/2010/main" spd="med" advClick="1"/>
+</p:sld>
+</file>
+
+<file path=ppt/slides/slide8.xml><?xml version="1.0" encoding="utf-8"?>
+<p:sld xmlns:a="http://schemas.openxmlformats.org/drawingml/2006/main" xmlns:r="http://schemas.openxmlformats.org/officeDocument/2006/relationships" xmlns:p="http://schemas.openxmlformats.org/presentationml/2006/main" xmlns:m="http://schemas.openxmlformats.org/officeDocument/2006/math" xmlns:a14="http://schemas.microsoft.com/office/drawing/2010/main" showMasterSp="1" showMasterPhAnim="1">
+  <p:cSld>
+    <p:spTree>
+      <p:nvGrpSpPr>
+        <p:cNvPr id="1" name=""/>
+        <p:cNvGrpSpPr/>
+        <p:nvPr/>
+      </p:nvGrpSpPr>
+      <p:grpSpPr>
+        <a:xfrm>
+          <a:off x="0" y="0"/>
+          <a:ext cx="0" cy="0"/>
+          <a:chOff x="0" y="0"/>
+          <a:chExt cx="0" cy="0"/>
+        </a:xfrm>
+      </p:grpSpPr>
       <p:sp>
         <p:nvSpPr>
-          <p:cNvPr id="158" name="Voortgang puzzel"/>
+          <p:cNvPr id="174" name="Voortgang puzzel"/>
           <p:cNvSpPr txBox="1"/>
           <p:nvPr>
             <p:ph type="title"/>
@@ -4333,7 +4722,7 @@
       </p:sp>
       <p:sp>
         <p:nvSpPr>
-          <p:cNvPr id="159" name="Slide Number"/>
+          <p:cNvPr id="175" name="Slide Number"/>
           <p:cNvSpPr txBox="1"/>
           <p:nvPr>
             <p:ph type="sldNum" sz="quarter" idx="4294967295"/>

</xml_diff>